<commit_message>
Implemented editing control points via text
Works for both relative and absolute coordinates.
Dragging control points is probably next.
Also, upgraded Unity version. Again.
</commit_message>
<xml_diff>
--- a/icons.pptx
+++ b/icons.pptx
@@ -104,6 +104,11 @@
       </a:defRPr>
     </a:lvl9pPr>
   </p:defaultTextStyle>
+  <p:extLst>
+    <p:ext uri="{EFAFB233-063F-42B5-8137-9DF3F51BA10A}">
+      <p15:sldGuideLst xmlns:p15="http://schemas.microsoft.com/office/powerpoint/2012/main"/>
+    </p:ext>
+  </p:extLst>
 </p:presentation>
 </file>
 
@@ -256,7 +261,7 @@
           <a:p>
             <a:fld id="{AD340E95-1000-4336-8AFA-0D173D87FB75}" type="datetimeFigureOut">
               <a:rPr lang="en-IL" smtClean="0"/>
-              <a:t>10/12/2021</a:t>
+              <a:t>11/12/2021</a:t>
             </a:fld>
             <a:endParaRPr lang="en-IL"/>
           </a:p>
@@ -456,7 +461,7 @@
           <a:p>
             <a:fld id="{AD340E95-1000-4336-8AFA-0D173D87FB75}" type="datetimeFigureOut">
               <a:rPr lang="en-IL" smtClean="0"/>
-              <a:t>10/12/2021</a:t>
+              <a:t>11/12/2021</a:t>
             </a:fld>
             <a:endParaRPr lang="en-IL"/>
           </a:p>
@@ -666,7 +671,7 @@
           <a:p>
             <a:fld id="{AD340E95-1000-4336-8AFA-0D173D87FB75}" type="datetimeFigureOut">
               <a:rPr lang="en-IL" smtClean="0"/>
-              <a:t>10/12/2021</a:t>
+              <a:t>11/12/2021</a:t>
             </a:fld>
             <a:endParaRPr lang="en-IL"/>
           </a:p>
@@ -866,7 +871,7 @@
           <a:p>
             <a:fld id="{AD340E95-1000-4336-8AFA-0D173D87FB75}" type="datetimeFigureOut">
               <a:rPr lang="en-IL" smtClean="0"/>
-              <a:t>10/12/2021</a:t>
+              <a:t>11/12/2021</a:t>
             </a:fld>
             <a:endParaRPr lang="en-IL"/>
           </a:p>
@@ -1142,7 +1147,7 @@
           <a:p>
             <a:fld id="{AD340E95-1000-4336-8AFA-0D173D87FB75}" type="datetimeFigureOut">
               <a:rPr lang="en-IL" smtClean="0"/>
-              <a:t>10/12/2021</a:t>
+              <a:t>11/12/2021</a:t>
             </a:fld>
             <a:endParaRPr lang="en-IL"/>
           </a:p>
@@ -1410,7 +1415,7 @@
           <a:p>
             <a:fld id="{AD340E95-1000-4336-8AFA-0D173D87FB75}" type="datetimeFigureOut">
               <a:rPr lang="en-IL" smtClean="0"/>
-              <a:t>10/12/2021</a:t>
+              <a:t>11/12/2021</a:t>
             </a:fld>
             <a:endParaRPr lang="en-IL"/>
           </a:p>
@@ -1825,7 +1830,7 @@
           <a:p>
             <a:fld id="{AD340E95-1000-4336-8AFA-0D173D87FB75}" type="datetimeFigureOut">
               <a:rPr lang="en-IL" smtClean="0"/>
-              <a:t>10/12/2021</a:t>
+              <a:t>11/12/2021</a:t>
             </a:fld>
             <a:endParaRPr lang="en-IL"/>
           </a:p>
@@ -1967,7 +1972,7 @@
           <a:p>
             <a:fld id="{AD340E95-1000-4336-8AFA-0D173D87FB75}" type="datetimeFigureOut">
               <a:rPr lang="en-IL" smtClean="0"/>
-              <a:t>10/12/2021</a:t>
+              <a:t>11/12/2021</a:t>
             </a:fld>
             <a:endParaRPr lang="en-IL"/>
           </a:p>
@@ -2080,7 +2085,7 @@
           <a:p>
             <a:fld id="{AD340E95-1000-4336-8AFA-0D173D87FB75}" type="datetimeFigureOut">
               <a:rPr lang="en-IL" smtClean="0"/>
-              <a:t>10/12/2021</a:t>
+              <a:t>11/12/2021</a:t>
             </a:fld>
             <a:endParaRPr lang="en-IL"/>
           </a:p>
@@ -2393,7 +2398,7 @@
           <a:p>
             <a:fld id="{AD340E95-1000-4336-8AFA-0D173D87FB75}" type="datetimeFigureOut">
               <a:rPr lang="en-IL" smtClean="0"/>
-              <a:t>10/12/2021</a:t>
+              <a:t>11/12/2021</a:t>
             </a:fld>
             <a:endParaRPr lang="en-IL"/>
           </a:p>
@@ -2682,7 +2687,7 @@
           <a:p>
             <a:fld id="{AD340E95-1000-4336-8AFA-0D173D87FB75}" type="datetimeFigureOut">
               <a:rPr lang="en-IL" smtClean="0"/>
-              <a:t>10/12/2021</a:t>
+              <a:t>11/12/2021</a:t>
             </a:fld>
             <a:endParaRPr lang="en-IL"/>
           </a:p>
@@ -2925,7 +2930,7 @@
           <a:p>
             <a:fld id="{AD340E95-1000-4336-8AFA-0D173D87FB75}" type="datetimeFigureOut">
               <a:rPr lang="en-IL" smtClean="0"/>
-              <a:t>10/12/2021</a:t>
+              <a:t>11/12/2021</a:t>
             </a:fld>
             <a:endParaRPr lang="en-IL"/>
           </a:p>
@@ -3694,6 +3699,162 @@
           </a:prstGeom>
         </p:spPr>
       </p:pic>
+      <p:sp>
+        <p:nvSpPr>
+          <p:cNvPr id="10" name="Freeform: Shape 9">
+            <a:extLst>
+              <a:ext uri="{FF2B5EF4-FFF2-40B4-BE49-F238E27FC236}">
+                <a16:creationId xmlns:a16="http://schemas.microsoft.com/office/drawing/2014/main" id="{91862B8C-21DB-45A0-85CC-6BFEBB7A87F9}"/>
+              </a:ext>
+            </a:extLst>
+          </p:cNvPr>
+          <p:cNvSpPr/>
+          <p:nvPr/>
+        </p:nvSpPr>
+        <p:spPr>
+          <a:xfrm>
+            <a:off x="2290312" y="2810490"/>
+            <a:ext cx="1311215" cy="467548"/>
+          </a:xfrm>
+          <a:custGeom>
+            <a:avLst/>
+            <a:gdLst>
+              <a:gd name="connsiteX0" fmla="*/ 0 w 1311215"/>
+              <a:gd name="connsiteY0" fmla="*/ 467548 h 467548"/>
+              <a:gd name="connsiteX1" fmla="*/ 448573 w 1311215"/>
+              <a:gd name="connsiteY1" fmla="*/ 1722 h 467548"/>
+              <a:gd name="connsiteX2" fmla="*/ 879894 w 1311215"/>
+              <a:gd name="connsiteY2" fmla="*/ 303646 h 467548"/>
+              <a:gd name="connsiteX3" fmla="*/ 1311215 w 1311215"/>
+              <a:gd name="connsiteY3" fmla="*/ 139744 h 467548"/>
+            </a:gdLst>
+            <a:ahLst/>
+            <a:cxnLst>
+              <a:cxn ang="0">
+                <a:pos x="connsiteX0" y="connsiteY0"/>
+              </a:cxn>
+              <a:cxn ang="0">
+                <a:pos x="connsiteX1" y="connsiteY1"/>
+              </a:cxn>
+              <a:cxn ang="0">
+                <a:pos x="connsiteX2" y="connsiteY2"/>
+              </a:cxn>
+              <a:cxn ang="0">
+                <a:pos x="connsiteX3" y="connsiteY3"/>
+              </a:cxn>
+            </a:cxnLst>
+            <a:rect l="l" t="t" r="r" b="b"/>
+            <a:pathLst>
+              <a:path w="1311215" h="467548">
+                <a:moveTo>
+                  <a:pt x="0" y="467548"/>
+                </a:moveTo>
+                <a:cubicBezTo>
+                  <a:pt x="150962" y="248293"/>
+                  <a:pt x="301924" y="29039"/>
+                  <a:pt x="448573" y="1722"/>
+                </a:cubicBezTo>
+                <a:cubicBezTo>
+                  <a:pt x="595222" y="-25595"/>
+                  <a:pt x="736120" y="280642"/>
+                  <a:pt x="879894" y="303646"/>
+                </a:cubicBezTo>
+                <a:cubicBezTo>
+                  <a:pt x="1023668" y="326650"/>
+                  <a:pt x="1167441" y="233197"/>
+                  <a:pt x="1311215" y="139744"/>
+                </a:cubicBezTo>
+              </a:path>
+            </a:pathLst>
+          </a:custGeom>
+          <a:noFill/>
+          <a:ln w="101600" cmpd="dbl">
+            <a:solidFill>
+              <a:schemeClr val="tx1"/>
+            </a:solidFill>
+          </a:ln>
+        </p:spPr>
+        <p:style>
+          <a:lnRef idx="2">
+            <a:schemeClr val="accent1">
+              <a:shade val="50000"/>
+            </a:schemeClr>
+          </a:lnRef>
+          <a:fillRef idx="1">
+            <a:schemeClr val="accent1"/>
+          </a:fillRef>
+          <a:effectRef idx="0">
+            <a:schemeClr val="accent1"/>
+          </a:effectRef>
+          <a:fontRef idx="minor">
+            <a:schemeClr val="lt1"/>
+          </a:fontRef>
+        </p:style>
+        <p:txBody>
+          <a:bodyPr rtlCol="0" anchor="ctr"/>
+          <a:lstStyle/>
+          <a:p>
+            <a:pPr algn="ctr"/>
+            <a:endParaRPr lang="en-IL"/>
+          </a:p>
+        </p:txBody>
+      </p:sp>
+      <p:sp>
+        <p:nvSpPr>
+          <p:cNvPr id="2" name="Multiplication Sign 1">
+            <a:extLst>
+              <a:ext uri="{FF2B5EF4-FFF2-40B4-BE49-F238E27FC236}">
+                <a16:creationId xmlns:a16="http://schemas.microsoft.com/office/drawing/2014/main" id="{3650E767-3371-4B02-8FD8-8256E70B21DB}"/>
+              </a:ext>
+            </a:extLst>
+          </p:cNvPr>
+          <p:cNvSpPr/>
+          <p:nvPr/>
+        </p:nvSpPr>
+        <p:spPr>
+          <a:xfrm rot="1032964">
+            <a:off x="2412748" y="2429171"/>
+            <a:ext cx="1009291" cy="1009291"/>
+          </a:xfrm>
+          <a:prstGeom prst="mathMultiply">
+            <a:avLst>
+              <a:gd name="adj1" fmla="val 8990"/>
+            </a:avLst>
+          </a:prstGeom>
+          <a:solidFill>
+            <a:schemeClr val="bg1"/>
+          </a:solidFill>
+          <a:ln w="38100">
+            <a:solidFill>
+              <a:schemeClr val="tx1"/>
+            </a:solidFill>
+          </a:ln>
+        </p:spPr>
+        <p:style>
+          <a:lnRef idx="2">
+            <a:schemeClr val="accent1">
+              <a:shade val="50000"/>
+            </a:schemeClr>
+          </a:lnRef>
+          <a:fillRef idx="1">
+            <a:schemeClr val="accent1"/>
+          </a:fillRef>
+          <a:effectRef idx="0">
+            <a:schemeClr val="accent1"/>
+          </a:effectRef>
+          <a:fontRef idx="minor">
+            <a:schemeClr val="lt1"/>
+          </a:fontRef>
+        </p:style>
+        <p:txBody>
+          <a:bodyPr rtlCol="0" anchor="ctr"/>
+          <a:lstStyle/>
+          <a:p>
+            <a:pPr algn="ctr"/>
+            <a:endParaRPr lang="en-IL"/>
+          </a:p>
+        </p:txBody>
+      </p:sp>
     </p:spTree>
     <p:extLst>
       <p:ext uri="{BB962C8B-B14F-4D97-AF65-F5344CB8AC3E}">

</xml_diff>

<commit_message>
Implemented copying curves, duplicating layers, and moving layers
Moving layers works only via text editing.
</commit_message>
<xml_diff>
--- a/icons.pptx
+++ b/icons.pptx
@@ -261,7 +261,7 @@
           <a:p>
             <a:fld id="{AD340E95-1000-4336-8AFA-0D173D87FB75}" type="datetimeFigureOut">
               <a:rPr lang="en-IL" smtClean="0"/>
-              <a:t>11/12/2021</a:t>
+              <a:t>15/12/2021</a:t>
             </a:fld>
             <a:endParaRPr lang="en-IL"/>
           </a:p>
@@ -461,7 +461,7 @@
           <a:p>
             <a:fld id="{AD340E95-1000-4336-8AFA-0D173D87FB75}" type="datetimeFigureOut">
               <a:rPr lang="en-IL" smtClean="0"/>
-              <a:t>11/12/2021</a:t>
+              <a:t>15/12/2021</a:t>
             </a:fld>
             <a:endParaRPr lang="en-IL"/>
           </a:p>
@@ -671,7 +671,7 @@
           <a:p>
             <a:fld id="{AD340E95-1000-4336-8AFA-0D173D87FB75}" type="datetimeFigureOut">
               <a:rPr lang="en-IL" smtClean="0"/>
-              <a:t>11/12/2021</a:t>
+              <a:t>15/12/2021</a:t>
             </a:fld>
             <a:endParaRPr lang="en-IL"/>
           </a:p>
@@ -871,7 +871,7 @@
           <a:p>
             <a:fld id="{AD340E95-1000-4336-8AFA-0D173D87FB75}" type="datetimeFigureOut">
               <a:rPr lang="en-IL" smtClean="0"/>
-              <a:t>11/12/2021</a:t>
+              <a:t>15/12/2021</a:t>
             </a:fld>
             <a:endParaRPr lang="en-IL"/>
           </a:p>
@@ -1147,7 +1147,7 @@
           <a:p>
             <a:fld id="{AD340E95-1000-4336-8AFA-0D173D87FB75}" type="datetimeFigureOut">
               <a:rPr lang="en-IL" smtClean="0"/>
-              <a:t>11/12/2021</a:t>
+              <a:t>15/12/2021</a:t>
             </a:fld>
             <a:endParaRPr lang="en-IL"/>
           </a:p>
@@ -1415,7 +1415,7 @@
           <a:p>
             <a:fld id="{AD340E95-1000-4336-8AFA-0D173D87FB75}" type="datetimeFigureOut">
               <a:rPr lang="en-IL" smtClean="0"/>
-              <a:t>11/12/2021</a:t>
+              <a:t>15/12/2021</a:t>
             </a:fld>
             <a:endParaRPr lang="en-IL"/>
           </a:p>
@@ -1830,7 +1830,7 @@
           <a:p>
             <a:fld id="{AD340E95-1000-4336-8AFA-0D173D87FB75}" type="datetimeFigureOut">
               <a:rPr lang="en-IL" smtClean="0"/>
-              <a:t>11/12/2021</a:t>
+              <a:t>15/12/2021</a:t>
             </a:fld>
             <a:endParaRPr lang="en-IL"/>
           </a:p>
@@ -1972,7 +1972,7 @@
           <a:p>
             <a:fld id="{AD340E95-1000-4336-8AFA-0D173D87FB75}" type="datetimeFigureOut">
               <a:rPr lang="en-IL" smtClean="0"/>
-              <a:t>11/12/2021</a:t>
+              <a:t>15/12/2021</a:t>
             </a:fld>
             <a:endParaRPr lang="en-IL"/>
           </a:p>
@@ -2085,7 +2085,7 @@
           <a:p>
             <a:fld id="{AD340E95-1000-4336-8AFA-0D173D87FB75}" type="datetimeFigureOut">
               <a:rPr lang="en-IL" smtClean="0"/>
-              <a:t>11/12/2021</a:t>
+              <a:t>15/12/2021</a:t>
             </a:fld>
             <a:endParaRPr lang="en-IL"/>
           </a:p>
@@ -2398,7 +2398,7 @@
           <a:p>
             <a:fld id="{AD340E95-1000-4336-8AFA-0D173D87FB75}" type="datetimeFigureOut">
               <a:rPr lang="en-IL" smtClean="0"/>
-              <a:t>11/12/2021</a:t>
+              <a:t>15/12/2021</a:t>
             </a:fld>
             <a:endParaRPr lang="en-IL"/>
           </a:p>
@@ -2687,7 +2687,7 @@
           <a:p>
             <a:fld id="{AD340E95-1000-4336-8AFA-0D173D87FB75}" type="datetimeFigureOut">
               <a:rPr lang="en-IL" smtClean="0"/>
-              <a:t>11/12/2021</a:t>
+              <a:t>15/12/2021</a:t>
             </a:fld>
             <a:endParaRPr lang="en-IL"/>
           </a:p>
@@ -2930,7 +2930,7 @@
           <a:p>
             <a:fld id="{AD340E95-1000-4336-8AFA-0D173D87FB75}" type="datetimeFigureOut">
               <a:rPr lang="en-IL" smtClean="0"/>
-              <a:t>11/12/2021</a:t>
+              <a:t>15/12/2021</a:t>
             </a:fld>
             <a:endParaRPr lang="en-IL"/>
           </a:p>
@@ -3855,6 +3855,531 @@
           </a:p>
         </p:txBody>
       </p:sp>
+      <p:sp>
+        <p:nvSpPr>
+          <p:cNvPr id="6" name="Parallelogram 5">
+            <a:extLst>
+              <a:ext uri="{FF2B5EF4-FFF2-40B4-BE49-F238E27FC236}">
+                <a16:creationId xmlns:a16="http://schemas.microsoft.com/office/drawing/2014/main" id="{D3263808-2937-40DC-B950-C2625000D22D}"/>
+              </a:ext>
+            </a:extLst>
+          </p:cNvPr>
+          <p:cNvSpPr/>
+          <p:nvPr/>
+        </p:nvSpPr>
+        <p:spPr>
+          <a:xfrm>
+            <a:off x="4511615" y="2810490"/>
+            <a:ext cx="1647645" cy="277767"/>
+          </a:xfrm>
+          <a:prstGeom prst="parallelogram">
+            <a:avLst>
+              <a:gd name="adj" fmla="val 170965"/>
+            </a:avLst>
+          </a:prstGeom>
+          <a:solidFill>
+            <a:schemeClr val="bg1"/>
+          </a:solidFill>
+          <a:ln w="76200">
+            <a:solidFill>
+              <a:schemeClr val="tx1"/>
+            </a:solidFill>
+          </a:ln>
+        </p:spPr>
+        <p:style>
+          <a:lnRef idx="2">
+            <a:schemeClr val="accent1">
+              <a:shade val="50000"/>
+            </a:schemeClr>
+          </a:lnRef>
+          <a:fillRef idx="1">
+            <a:schemeClr val="accent1"/>
+          </a:fillRef>
+          <a:effectRef idx="0">
+            <a:schemeClr val="accent1"/>
+          </a:effectRef>
+          <a:fontRef idx="minor">
+            <a:schemeClr val="lt1"/>
+          </a:fontRef>
+        </p:style>
+        <p:txBody>
+          <a:bodyPr rtlCol="0" anchor="ctr"/>
+          <a:lstStyle/>
+          <a:p>
+            <a:pPr algn="ctr"/>
+            <a:endParaRPr lang="en-IL"/>
+          </a:p>
+        </p:txBody>
+      </p:sp>
+      <p:sp>
+        <p:nvSpPr>
+          <p:cNvPr id="14" name="Freeform: Shape 13">
+            <a:extLst>
+              <a:ext uri="{FF2B5EF4-FFF2-40B4-BE49-F238E27FC236}">
+                <a16:creationId xmlns:a16="http://schemas.microsoft.com/office/drawing/2014/main" id="{CB1B2520-D988-4553-815B-F4FD8784F4C4}"/>
+              </a:ext>
+            </a:extLst>
+          </p:cNvPr>
+          <p:cNvSpPr/>
+          <p:nvPr/>
+        </p:nvSpPr>
+        <p:spPr>
+          <a:xfrm>
+            <a:off x="4933395" y="2854483"/>
+            <a:ext cx="655608" cy="233774"/>
+          </a:xfrm>
+          <a:custGeom>
+            <a:avLst/>
+            <a:gdLst>
+              <a:gd name="connsiteX0" fmla="*/ 0 w 1311215"/>
+              <a:gd name="connsiteY0" fmla="*/ 467548 h 467548"/>
+              <a:gd name="connsiteX1" fmla="*/ 448573 w 1311215"/>
+              <a:gd name="connsiteY1" fmla="*/ 1722 h 467548"/>
+              <a:gd name="connsiteX2" fmla="*/ 879894 w 1311215"/>
+              <a:gd name="connsiteY2" fmla="*/ 303646 h 467548"/>
+              <a:gd name="connsiteX3" fmla="*/ 1311215 w 1311215"/>
+              <a:gd name="connsiteY3" fmla="*/ 139744 h 467548"/>
+            </a:gdLst>
+            <a:ahLst/>
+            <a:cxnLst>
+              <a:cxn ang="0">
+                <a:pos x="connsiteX0" y="connsiteY0"/>
+              </a:cxn>
+              <a:cxn ang="0">
+                <a:pos x="connsiteX1" y="connsiteY1"/>
+              </a:cxn>
+              <a:cxn ang="0">
+                <a:pos x="connsiteX2" y="connsiteY2"/>
+              </a:cxn>
+              <a:cxn ang="0">
+                <a:pos x="connsiteX3" y="connsiteY3"/>
+              </a:cxn>
+            </a:cxnLst>
+            <a:rect l="l" t="t" r="r" b="b"/>
+            <a:pathLst>
+              <a:path w="1311215" h="467548">
+                <a:moveTo>
+                  <a:pt x="0" y="467548"/>
+                </a:moveTo>
+                <a:cubicBezTo>
+                  <a:pt x="150962" y="248293"/>
+                  <a:pt x="301924" y="29039"/>
+                  <a:pt x="448573" y="1722"/>
+                </a:cubicBezTo>
+                <a:cubicBezTo>
+                  <a:pt x="595222" y="-25595"/>
+                  <a:pt x="736120" y="280642"/>
+                  <a:pt x="879894" y="303646"/>
+                </a:cubicBezTo>
+                <a:cubicBezTo>
+                  <a:pt x="1023668" y="326650"/>
+                  <a:pt x="1167441" y="233197"/>
+                  <a:pt x="1311215" y="139744"/>
+                </a:cubicBezTo>
+              </a:path>
+            </a:pathLst>
+          </a:custGeom>
+          <a:noFill/>
+          <a:ln w="101600" cmpd="dbl">
+            <a:solidFill>
+              <a:schemeClr val="tx1"/>
+            </a:solidFill>
+          </a:ln>
+        </p:spPr>
+        <p:style>
+          <a:lnRef idx="2">
+            <a:schemeClr val="accent1">
+              <a:shade val="50000"/>
+            </a:schemeClr>
+          </a:lnRef>
+          <a:fillRef idx="1">
+            <a:schemeClr val="accent1"/>
+          </a:fillRef>
+          <a:effectRef idx="0">
+            <a:schemeClr val="accent1"/>
+          </a:effectRef>
+          <a:fontRef idx="minor">
+            <a:schemeClr val="lt1"/>
+          </a:fontRef>
+        </p:style>
+        <p:txBody>
+          <a:bodyPr rtlCol="0" anchor="ctr"/>
+          <a:lstStyle/>
+          <a:p>
+            <a:pPr algn="ctr"/>
+            <a:endParaRPr lang="en-IL"/>
+          </a:p>
+        </p:txBody>
+      </p:sp>
+      <p:sp>
+        <p:nvSpPr>
+          <p:cNvPr id="15" name="Parallelogram 14">
+            <a:extLst>
+              <a:ext uri="{FF2B5EF4-FFF2-40B4-BE49-F238E27FC236}">
+                <a16:creationId xmlns:a16="http://schemas.microsoft.com/office/drawing/2014/main" id="{46DC9E38-FF74-4F8A-A86E-FDA811B4E51B}"/>
+              </a:ext>
+            </a:extLst>
+          </p:cNvPr>
+          <p:cNvSpPr/>
+          <p:nvPr/>
+        </p:nvSpPr>
+        <p:spPr>
+          <a:xfrm>
+            <a:off x="4678915" y="2576716"/>
+            <a:ext cx="1647645" cy="277767"/>
+          </a:xfrm>
+          <a:prstGeom prst="parallelogram">
+            <a:avLst>
+              <a:gd name="adj" fmla="val 170965"/>
+            </a:avLst>
+          </a:prstGeom>
+          <a:solidFill>
+            <a:schemeClr val="bg1"/>
+          </a:solidFill>
+          <a:ln w="76200">
+            <a:solidFill>
+              <a:schemeClr val="tx1"/>
+            </a:solidFill>
+          </a:ln>
+        </p:spPr>
+        <p:style>
+          <a:lnRef idx="2">
+            <a:schemeClr val="accent1">
+              <a:shade val="50000"/>
+            </a:schemeClr>
+          </a:lnRef>
+          <a:fillRef idx="1">
+            <a:schemeClr val="accent1"/>
+          </a:fillRef>
+          <a:effectRef idx="0">
+            <a:schemeClr val="accent1"/>
+          </a:effectRef>
+          <a:fontRef idx="minor">
+            <a:schemeClr val="lt1"/>
+          </a:fontRef>
+        </p:style>
+        <p:txBody>
+          <a:bodyPr rtlCol="0" anchor="ctr"/>
+          <a:lstStyle/>
+          <a:p>
+            <a:pPr algn="ctr"/>
+            <a:endParaRPr lang="en-IL"/>
+          </a:p>
+        </p:txBody>
+      </p:sp>
+      <p:sp>
+        <p:nvSpPr>
+          <p:cNvPr id="16" name="Freeform: Shape 15">
+            <a:extLst>
+              <a:ext uri="{FF2B5EF4-FFF2-40B4-BE49-F238E27FC236}">
+                <a16:creationId xmlns:a16="http://schemas.microsoft.com/office/drawing/2014/main" id="{1E3DD4B2-995E-400B-B71D-530266597980}"/>
+              </a:ext>
+            </a:extLst>
+          </p:cNvPr>
+          <p:cNvSpPr/>
+          <p:nvPr/>
+        </p:nvSpPr>
+        <p:spPr>
+          <a:xfrm>
+            <a:off x="5100695" y="2620709"/>
+            <a:ext cx="655608" cy="233774"/>
+          </a:xfrm>
+          <a:custGeom>
+            <a:avLst/>
+            <a:gdLst>
+              <a:gd name="connsiteX0" fmla="*/ 0 w 1311215"/>
+              <a:gd name="connsiteY0" fmla="*/ 467548 h 467548"/>
+              <a:gd name="connsiteX1" fmla="*/ 448573 w 1311215"/>
+              <a:gd name="connsiteY1" fmla="*/ 1722 h 467548"/>
+              <a:gd name="connsiteX2" fmla="*/ 879894 w 1311215"/>
+              <a:gd name="connsiteY2" fmla="*/ 303646 h 467548"/>
+              <a:gd name="connsiteX3" fmla="*/ 1311215 w 1311215"/>
+              <a:gd name="connsiteY3" fmla="*/ 139744 h 467548"/>
+            </a:gdLst>
+            <a:ahLst/>
+            <a:cxnLst>
+              <a:cxn ang="0">
+                <a:pos x="connsiteX0" y="connsiteY0"/>
+              </a:cxn>
+              <a:cxn ang="0">
+                <a:pos x="connsiteX1" y="connsiteY1"/>
+              </a:cxn>
+              <a:cxn ang="0">
+                <a:pos x="connsiteX2" y="connsiteY2"/>
+              </a:cxn>
+              <a:cxn ang="0">
+                <a:pos x="connsiteX3" y="connsiteY3"/>
+              </a:cxn>
+            </a:cxnLst>
+            <a:rect l="l" t="t" r="r" b="b"/>
+            <a:pathLst>
+              <a:path w="1311215" h="467548">
+                <a:moveTo>
+                  <a:pt x="0" y="467548"/>
+                </a:moveTo>
+                <a:cubicBezTo>
+                  <a:pt x="150962" y="248293"/>
+                  <a:pt x="301924" y="29039"/>
+                  <a:pt x="448573" y="1722"/>
+                </a:cubicBezTo>
+                <a:cubicBezTo>
+                  <a:pt x="595222" y="-25595"/>
+                  <a:pt x="736120" y="280642"/>
+                  <a:pt x="879894" y="303646"/>
+                </a:cubicBezTo>
+                <a:cubicBezTo>
+                  <a:pt x="1023668" y="326650"/>
+                  <a:pt x="1167441" y="233197"/>
+                  <a:pt x="1311215" y="139744"/>
+                </a:cubicBezTo>
+              </a:path>
+            </a:pathLst>
+          </a:custGeom>
+          <a:noFill/>
+          <a:ln w="101600" cmpd="dbl">
+            <a:solidFill>
+              <a:schemeClr val="tx1"/>
+            </a:solidFill>
+          </a:ln>
+        </p:spPr>
+        <p:style>
+          <a:lnRef idx="2">
+            <a:schemeClr val="accent1">
+              <a:shade val="50000"/>
+            </a:schemeClr>
+          </a:lnRef>
+          <a:fillRef idx="1">
+            <a:schemeClr val="accent1"/>
+          </a:fillRef>
+          <a:effectRef idx="0">
+            <a:schemeClr val="accent1"/>
+          </a:effectRef>
+          <a:fontRef idx="minor">
+            <a:schemeClr val="lt1"/>
+          </a:fontRef>
+        </p:style>
+        <p:txBody>
+          <a:bodyPr rtlCol="0" anchor="ctr"/>
+          <a:lstStyle/>
+          <a:p>
+            <a:pPr algn="ctr"/>
+            <a:endParaRPr lang="en-IL"/>
+          </a:p>
+        </p:txBody>
+      </p:sp>
+      <p:sp>
+        <p:nvSpPr>
+          <p:cNvPr id="19" name="Parallelogram 18">
+            <a:extLst>
+              <a:ext uri="{FF2B5EF4-FFF2-40B4-BE49-F238E27FC236}">
+                <a16:creationId xmlns:a16="http://schemas.microsoft.com/office/drawing/2014/main" id="{3BBBA7FD-B24B-4FB6-ACE6-6962605E38E1}"/>
+              </a:ext>
+            </a:extLst>
+          </p:cNvPr>
+          <p:cNvSpPr/>
+          <p:nvPr/>
+        </p:nvSpPr>
+        <p:spPr>
+          <a:xfrm>
+            <a:off x="6748340" y="2725947"/>
+            <a:ext cx="2410089" cy="406303"/>
+          </a:xfrm>
+          <a:prstGeom prst="parallelogram">
+            <a:avLst>
+              <a:gd name="adj" fmla="val 170965"/>
+            </a:avLst>
+          </a:prstGeom>
+          <a:solidFill>
+            <a:schemeClr val="bg1"/>
+          </a:solidFill>
+          <a:ln w="76200">
+            <a:solidFill>
+              <a:schemeClr val="tx1"/>
+            </a:solidFill>
+            <a:prstDash val="sysDot"/>
+          </a:ln>
+        </p:spPr>
+        <p:style>
+          <a:lnRef idx="2">
+            <a:schemeClr val="accent1">
+              <a:shade val="50000"/>
+            </a:schemeClr>
+          </a:lnRef>
+          <a:fillRef idx="1">
+            <a:schemeClr val="accent1"/>
+          </a:fillRef>
+          <a:effectRef idx="0">
+            <a:schemeClr val="accent1"/>
+          </a:effectRef>
+          <a:fontRef idx="minor">
+            <a:schemeClr val="lt1"/>
+          </a:fontRef>
+        </p:style>
+        <p:txBody>
+          <a:bodyPr rtlCol="0" anchor="ctr"/>
+          <a:lstStyle/>
+          <a:p>
+            <a:pPr algn="ctr"/>
+            <a:endParaRPr lang="en-IL"/>
+          </a:p>
+        </p:txBody>
+      </p:sp>
+      <p:sp>
+        <p:nvSpPr>
+          <p:cNvPr id="17" name="Parallelogram 16">
+            <a:extLst>
+              <a:ext uri="{FF2B5EF4-FFF2-40B4-BE49-F238E27FC236}">
+                <a16:creationId xmlns:a16="http://schemas.microsoft.com/office/drawing/2014/main" id="{BFB96D92-2A70-4DFC-AE07-7B321EA2616D}"/>
+              </a:ext>
+            </a:extLst>
+          </p:cNvPr>
+          <p:cNvSpPr/>
+          <p:nvPr/>
+        </p:nvSpPr>
+        <p:spPr>
+          <a:xfrm>
+            <a:off x="6748340" y="2854483"/>
+            <a:ext cx="1647645" cy="277767"/>
+          </a:xfrm>
+          <a:prstGeom prst="parallelogram">
+            <a:avLst>
+              <a:gd name="adj" fmla="val 170965"/>
+            </a:avLst>
+          </a:prstGeom>
+          <a:solidFill>
+            <a:schemeClr val="bg1"/>
+          </a:solidFill>
+          <a:ln w="76200">
+            <a:solidFill>
+              <a:schemeClr val="tx1"/>
+            </a:solidFill>
+          </a:ln>
+        </p:spPr>
+        <p:style>
+          <a:lnRef idx="2">
+            <a:schemeClr val="accent1">
+              <a:shade val="50000"/>
+            </a:schemeClr>
+          </a:lnRef>
+          <a:fillRef idx="1">
+            <a:schemeClr val="accent1"/>
+          </a:fillRef>
+          <a:effectRef idx="0">
+            <a:schemeClr val="accent1"/>
+          </a:effectRef>
+          <a:fontRef idx="minor">
+            <a:schemeClr val="lt1"/>
+          </a:fontRef>
+        </p:style>
+        <p:txBody>
+          <a:bodyPr rtlCol="0" anchor="ctr"/>
+          <a:lstStyle/>
+          <a:p>
+            <a:pPr algn="ctr"/>
+            <a:endParaRPr lang="en-IL"/>
+          </a:p>
+        </p:txBody>
+      </p:sp>
+      <p:sp>
+        <p:nvSpPr>
+          <p:cNvPr id="18" name="Freeform: Shape 17">
+            <a:extLst>
+              <a:ext uri="{FF2B5EF4-FFF2-40B4-BE49-F238E27FC236}">
+                <a16:creationId xmlns:a16="http://schemas.microsoft.com/office/drawing/2014/main" id="{5743229F-F782-4CC4-AA25-D9EB8608F96A}"/>
+              </a:ext>
+            </a:extLst>
+          </p:cNvPr>
+          <p:cNvSpPr/>
+          <p:nvPr/>
+        </p:nvSpPr>
+        <p:spPr>
+          <a:xfrm>
+            <a:off x="7170120" y="2898476"/>
+            <a:ext cx="655608" cy="233774"/>
+          </a:xfrm>
+          <a:custGeom>
+            <a:avLst/>
+            <a:gdLst>
+              <a:gd name="connsiteX0" fmla="*/ 0 w 1311215"/>
+              <a:gd name="connsiteY0" fmla="*/ 467548 h 467548"/>
+              <a:gd name="connsiteX1" fmla="*/ 448573 w 1311215"/>
+              <a:gd name="connsiteY1" fmla="*/ 1722 h 467548"/>
+              <a:gd name="connsiteX2" fmla="*/ 879894 w 1311215"/>
+              <a:gd name="connsiteY2" fmla="*/ 303646 h 467548"/>
+              <a:gd name="connsiteX3" fmla="*/ 1311215 w 1311215"/>
+              <a:gd name="connsiteY3" fmla="*/ 139744 h 467548"/>
+            </a:gdLst>
+            <a:ahLst/>
+            <a:cxnLst>
+              <a:cxn ang="0">
+                <a:pos x="connsiteX0" y="connsiteY0"/>
+              </a:cxn>
+              <a:cxn ang="0">
+                <a:pos x="connsiteX1" y="connsiteY1"/>
+              </a:cxn>
+              <a:cxn ang="0">
+                <a:pos x="connsiteX2" y="connsiteY2"/>
+              </a:cxn>
+              <a:cxn ang="0">
+                <a:pos x="connsiteX3" y="connsiteY3"/>
+              </a:cxn>
+            </a:cxnLst>
+            <a:rect l="l" t="t" r="r" b="b"/>
+            <a:pathLst>
+              <a:path w="1311215" h="467548">
+                <a:moveTo>
+                  <a:pt x="0" y="467548"/>
+                </a:moveTo>
+                <a:cubicBezTo>
+                  <a:pt x="150962" y="248293"/>
+                  <a:pt x="301924" y="29039"/>
+                  <a:pt x="448573" y="1722"/>
+                </a:cubicBezTo>
+                <a:cubicBezTo>
+                  <a:pt x="595222" y="-25595"/>
+                  <a:pt x="736120" y="280642"/>
+                  <a:pt x="879894" y="303646"/>
+                </a:cubicBezTo>
+                <a:cubicBezTo>
+                  <a:pt x="1023668" y="326650"/>
+                  <a:pt x="1167441" y="233197"/>
+                  <a:pt x="1311215" y="139744"/>
+                </a:cubicBezTo>
+              </a:path>
+            </a:pathLst>
+          </a:custGeom>
+          <a:noFill/>
+          <a:ln w="101600" cmpd="dbl">
+            <a:solidFill>
+              <a:schemeClr val="tx1"/>
+            </a:solidFill>
+          </a:ln>
+        </p:spPr>
+        <p:style>
+          <a:lnRef idx="2">
+            <a:schemeClr val="accent1">
+              <a:shade val="50000"/>
+            </a:schemeClr>
+          </a:lnRef>
+          <a:fillRef idx="1">
+            <a:schemeClr val="accent1"/>
+          </a:fillRef>
+          <a:effectRef idx="0">
+            <a:schemeClr val="accent1"/>
+          </a:effectRef>
+          <a:fontRef idx="minor">
+            <a:schemeClr val="lt1"/>
+          </a:fontRef>
+        </p:style>
+        <p:txBody>
+          <a:bodyPr rtlCol="0" anchor="ctr"/>
+          <a:lstStyle/>
+          <a:p>
+            <a:pPr algn="ctr"/>
+            <a:endParaRPr lang="en-IL"/>
+          </a:p>
+        </p:txBody>
+      </p:sp>
     </p:spTree>
     <p:extLst>
       <p:ext uri="{BB962C8B-B14F-4D97-AF65-F5344CB8AC3E}">

</xml_diff>

<commit_message>
Implemented rotate and scale
Next: upload file, mirror, scale whole layer, uniformly scale everything...
</commit_message>
<xml_diff>
--- a/icons.pptx
+++ b/icons.pptx
@@ -261,7 +261,7 @@
           <a:p>
             <a:fld id="{AD340E95-1000-4336-8AFA-0D173D87FB75}" type="datetimeFigureOut">
               <a:rPr lang="en-IL" smtClean="0"/>
-              <a:t>31/12/2021</a:t>
+              <a:t>02/01/2022</a:t>
             </a:fld>
             <a:endParaRPr lang="en-IL"/>
           </a:p>
@@ -461,7 +461,7 @@
           <a:p>
             <a:fld id="{AD340E95-1000-4336-8AFA-0D173D87FB75}" type="datetimeFigureOut">
               <a:rPr lang="en-IL" smtClean="0"/>
-              <a:t>31/12/2021</a:t>
+              <a:t>02/01/2022</a:t>
             </a:fld>
             <a:endParaRPr lang="en-IL"/>
           </a:p>
@@ -671,7 +671,7 @@
           <a:p>
             <a:fld id="{AD340E95-1000-4336-8AFA-0D173D87FB75}" type="datetimeFigureOut">
               <a:rPr lang="en-IL" smtClean="0"/>
-              <a:t>31/12/2021</a:t>
+              <a:t>02/01/2022</a:t>
             </a:fld>
             <a:endParaRPr lang="en-IL"/>
           </a:p>
@@ -871,7 +871,7 @@
           <a:p>
             <a:fld id="{AD340E95-1000-4336-8AFA-0D173D87FB75}" type="datetimeFigureOut">
               <a:rPr lang="en-IL" smtClean="0"/>
-              <a:t>31/12/2021</a:t>
+              <a:t>02/01/2022</a:t>
             </a:fld>
             <a:endParaRPr lang="en-IL"/>
           </a:p>
@@ -1147,7 +1147,7 @@
           <a:p>
             <a:fld id="{AD340E95-1000-4336-8AFA-0D173D87FB75}" type="datetimeFigureOut">
               <a:rPr lang="en-IL" smtClean="0"/>
-              <a:t>31/12/2021</a:t>
+              <a:t>02/01/2022</a:t>
             </a:fld>
             <a:endParaRPr lang="en-IL"/>
           </a:p>
@@ -1415,7 +1415,7 @@
           <a:p>
             <a:fld id="{AD340E95-1000-4336-8AFA-0D173D87FB75}" type="datetimeFigureOut">
               <a:rPr lang="en-IL" smtClean="0"/>
-              <a:t>31/12/2021</a:t>
+              <a:t>02/01/2022</a:t>
             </a:fld>
             <a:endParaRPr lang="en-IL"/>
           </a:p>
@@ -1830,7 +1830,7 @@
           <a:p>
             <a:fld id="{AD340E95-1000-4336-8AFA-0D173D87FB75}" type="datetimeFigureOut">
               <a:rPr lang="en-IL" smtClean="0"/>
-              <a:t>31/12/2021</a:t>
+              <a:t>02/01/2022</a:t>
             </a:fld>
             <a:endParaRPr lang="en-IL"/>
           </a:p>
@@ -1972,7 +1972,7 @@
           <a:p>
             <a:fld id="{AD340E95-1000-4336-8AFA-0D173D87FB75}" type="datetimeFigureOut">
               <a:rPr lang="en-IL" smtClean="0"/>
-              <a:t>31/12/2021</a:t>
+              <a:t>02/01/2022</a:t>
             </a:fld>
             <a:endParaRPr lang="en-IL"/>
           </a:p>
@@ -2085,7 +2085,7 @@
           <a:p>
             <a:fld id="{AD340E95-1000-4336-8AFA-0D173D87FB75}" type="datetimeFigureOut">
               <a:rPr lang="en-IL" smtClean="0"/>
-              <a:t>31/12/2021</a:t>
+              <a:t>02/01/2022</a:t>
             </a:fld>
             <a:endParaRPr lang="en-IL"/>
           </a:p>
@@ -2398,7 +2398,7 @@
           <a:p>
             <a:fld id="{AD340E95-1000-4336-8AFA-0D173D87FB75}" type="datetimeFigureOut">
               <a:rPr lang="en-IL" smtClean="0"/>
-              <a:t>31/12/2021</a:t>
+              <a:t>02/01/2022</a:t>
             </a:fld>
             <a:endParaRPr lang="en-IL"/>
           </a:p>
@@ -2687,7 +2687,7 @@
           <a:p>
             <a:fld id="{AD340E95-1000-4336-8AFA-0D173D87FB75}" type="datetimeFigureOut">
               <a:rPr lang="en-IL" smtClean="0"/>
-              <a:t>31/12/2021</a:t>
+              <a:t>02/01/2022</a:t>
             </a:fld>
             <a:endParaRPr lang="en-IL"/>
           </a:p>
@@ -2930,7 +2930,7 @@
           <a:p>
             <a:fld id="{AD340E95-1000-4336-8AFA-0D173D87FB75}" type="datetimeFigureOut">
               <a:rPr lang="en-IL" smtClean="0"/>
-              <a:t>31/12/2021</a:t>
+              <a:t>02/01/2022</a:t>
             </a:fld>
             <a:endParaRPr lang="en-IL"/>
           </a:p>
@@ -4653,6 +4653,251 @@
               <a:schemeClr val="tx1"/>
             </a:solidFill>
             <a:prstDash val="sysDot"/>
+          </a:ln>
+        </p:spPr>
+        <p:style>
+          <a:lnRef idx="1">
+            <a:schemeClr val="accent1"/>
+          </a:lnRef>
+          <a:fillRef idx="0">
+            <a:schemeClr val="accent1"/>
+          </a:fillRef>
+          <a:effectRef idx="0">
+            <a:schemeClr val="accent1"/>
+          </a:effectRef>
+          <a:fontRef idx="minor">
+            <a:schemeClr val="tx1"/>
+          </a:fontRef>
+        </p:style>
+      </p:cxnSp>
+      <p:sp>
+        <p:nvSpPr>
+          <p:cNvPr id="23" name="Freeform: Shape 22">
+            <a:extLst>
+              <a:ext uri="{FF2B5EF4-FFF2-40B4-BE49-F238E27FC236}">
+                <a16:creationId xmlns:a16="http://schemas.microsoft.com/office/drawing/2014/main" id="{9542E657-9227-4508-8477-9800D153AECE}"/>
+              </a:ext>
+            </a:extLst>
+          </p:cNvPr>
+          <p:cNvSpPr/>
+          <p:nvPr/>
+        </p:nvSpPr>
+        <p:spPr>
+          <a:xfrm>
+            <a:off x="2042704" y="4518519"/>
+            <a:ext cx="1311215" cy="467548"/>
+          </a:xfrm>
+          <a:custGeom>
+            <a:avLst/>
+            <a:gdLst>
+              <a:gd name="connsiteX0" fmla="*/ 0 w 1311215"/>
+              <a:gd name="connsiteY0" fmla="*/ 467548 h 467548"/>
+              <a:gd name="connsiteX1" fmla="*/ 448573 w 1311215"/>
+              <a:gd name="connsiteY1" fmla="*/ 1722 h 467548"/>
+              <a:gd name="connsiteX2" fmla="*/ 879894 w 1311215"/>
+              <a:gd name="connsiteY2" fmla="*/ 303646 h 467548"/>
+              <a:gd name="connsiteX3" fmla="*/ 1311215 w 1311215"/>
+              <a:gd name="connsiteY3" fmla="*/ 139744 h 467548"/>
+            </a:gdLst>
+            <a:ahLst/>
+            <a:cxnLst>
+              <a:cxn ang="0">
+                <a:pos x="connsiteX0" y="connsiteY0"/>
+              </a:cxn>
+              <a:cxn ang="0">
+                <a:pos x="connsiteX1" y="connsiteY1"/>
+              </a:cxn>
+              <a:cxn ang="0">
+                <a:pos x="connsiteX2" y="connsiteY2"/>
+              </a:cxn>
+              <a:cxn ang="0">
+                <a:pos x="connsiteX3" y="connsiteY3"/>
+              </a:cxn>
+            </a:cxnLst>
+            <a:rect l="l" t="t" r="r" b="b"/>
+            <a:pathLst>
+              <a:path w="1311215" h="467548">
+                <a:moveTo>
+                  <a:pt x="0" y="467548"/>
+                </a:moveTo>
+                <a:cubicBezTo>
+                  <a:pt x="150962" y="248293"/>
+                  <a:pt x="301924" y="29039"/>
+                  <a:pt x="448573" y="1722"/>
+                </a:cubicBezTo>
+                <a:cubicBezTo>
+                  <a:pt x="595222" y="-25595"/>
+                  <a:pt x="736120" y="280642"/>
+                  <a:pt x="879894" y="303646"/>
+                </a:cubicBezTo>
+                <a:cubicBezTo>
+                  <a:pt x="1023668" y="326650"/>
+                  <a:pt x="1167441" y="233197"/>
+                  <a:pt x="1311215" y="139744"/>
+                </a:cubicBezTo>
+              </a:path>
+            </a:pathLst>
+          </a:custGeom>
+          <a:noFill/>
+          <a:ln w="101600" cmpd="dbl">
+            <a:solidFill>
+              <a:schemeClr val="tx1"/>
+            </a:solidFill>
+          </a:ln>
+        </p:spPr>
+        <p:style>
+          <a:lnRef idx="2">
+            <a:schemeClr val="accent1">
+              <a:shade val="50000"/>
+            </a:schemeClr>
+          </a:lnRef>
+          <a:fillRef idx="1">
+            <a:schemeClr val="accent1"/>
+          </a:fillRef>
+          <a:effectRef idx="0">
+            <a:schemeClr val="accent1"/>
+          </a:effectRef>
+          <a:fontRef idx="minor">
+            <a:schemeClr val="lt1"/>
+          </a:fontRef>
+        </p:style>
+        <p:txBody>
+          <a:bodyPr rtlCol="0" anchor="ctr"/>
+          <a:lstStyle/>
+          <a:p>
+            <a:pPr algn="ctr"/>
+            <a:endParaRPr lang="en-IL"/>
+          </a:p>
+        </p:txBody>
+      </p:sp>
+      <p:sp>
+        <p:nvSpPr>
+          <p:cNvPr id="24" name="Freeform: Shape 23">
+            <a:extLst>
+              <a:ext uri="{FF2B5EF4-FFF2-40B4-BE49-F238E27FC236}">
+                <a16:creationId xmlns:a16="http://schemas.microsoft.com/office/drawing/2014/main" id="{5220E04D-9D82-4875-B56D-8C2C5D0DA866}"/>
+              </a:ext>
+            </a:extLst>
+          </p:cNvPr>
+          <p:cNvSpPr/>
+          <p:nvPr/>
+        </p:nvSpPr>
+        <p:spPr>
+          <a:xfrm flipV="1">
+            <a:off x="2042704" y="3848139"/>
+            <a:ext cx="1311215" cy="467548"/>
+          </a:xfrm>
+          <a:custGeom>
+            <a:avLst/>
+            <a:gdLst>
+              <a:gd name="connsiteX0" fmla="*/ 0 w 1311215"/>
+              <a:gd name="connsiteY0" fmla="*/ 467548 h 467548"/>
+              <a:gd name="connsiteX1" fmla="*/ 448573 w 1311215"/>
+              <a:gd name="connsiteY1" fmla="*/ 1722 h 467548"/>
+              <a:gd name="connsiteX2" fmla="*/ 879894 w 1311215"/>
+              <a:gd name="connsiteY2" fmla="*/ 303646 h 467548"/>
+              <a:gd name="connsiteX3" fmla="*/ 1311215 w 1311215"/>
+              <a:gd name="connsiteY3" fmla="*/ 139744 h 467548"/>
+            </a:gdLst>
+            <a:ahLst/>
+            <a:cxnLst>
+              <a:cxn ang="0">
+                <a:pos x="connsiteX0" y="connsiteY0"/>
+              </a:cxn>
+              <a:cxn ang="0">
+                <a:pos x="connsiteX1" y="connsiteY1"/>
+              </a:cxn>
+              <a:cxn ang="0">
+                <a:pos x="connsiteX2" y="connsiteY2"/>
+              </a:cxn>
+              <a:cxn ang="0">
+                <a:pos x="connsiteX3" y="connsiteY3"/>
+              </a:cxn>
+            </a:cxnLst>
+            <a:rect l="l" t="t" r="r" b="b"/>
+            <a:pathLst>
+              <a:path w="1311215" h="467548">
+                <a:moveTo>
+                  <a:pt x="0" y="467548"/>
+                </a:moveTo>
+                <a:cubicBezTo>
+                  <a:pt x="150962" y="248293"/>
+                  <a:pt x="301924" y="29039"/>
+                  <a:pt x="448573" y="1722"/>
+                </a:cubicBezTo>
+                <a:cubicBezTo>
+                  <a:pt x="595222" y="-25595"/>
+                  <a:pt x="736120" y="280642"/>
+                  <a:pt x="879894" y="303646"/>
+                </a:cubicBezTo>
+                <a:cubicBezTo>
+                  <a:pt x="1023668" y="326650"/>
+                  <a:pt x="1167441" y="233197"/>
+                  <a:pt x="1311215" y="139744"/>
+                </a:cubicBezTo>
+              </a:path>
+            </a:pathLst>
+          </a:custGeom>
+          <a:noFill/>
+          <a:ln w="101600" cmpd="dbl">
+            <a:solidFill>
+              <a:schemeClr val="tx1"/>
+            </a:solidFill>
+            <a:prstDash val="sysDot"/>
+          </a:ln>
+        </p:spPr>
+        <p:style>
+          <a:lnRef idx="2">
+            <a:schemeClr val="accent1">
+              <a:shade val="50000"/>
+            </a:schemeClr>
+          </a:lnRef>
+          <a:fillRef idx="1">
+            <a:schemeClr val="accent1"/>
+          </a:fillRef>
+          <a:effectRef idx="0">
+            <a:schemeClr val="accent1"/>
+          </a:effectRef>
+          <a:fontRef idx="minor">
+            <a:schemeClr val="lt1"/>
+          </a:fontRef>
+        </p:style>
+        <p:txBody>
+          <a:bodyPr rtlCol="0" anchor="ctr"/>
+          <a:lstStyle/>
+          <a:p>
+            <a:pPr algn="ctr"/>
+            <a:endParaRPr lang="en-IL"/>
+          </a:p>
+        </p:txBody>
+      </p:sp>
+      <p:cxnSp>
+        <p:nvCxnSpPr>
+          <p:cNvPr id="25" name="Straight Connector 24">
+            <a:extLst>
+              <a:ext uri="{FF2B5EF4-FFF2-40B4-BE49-F238E27FC236}">
+                <a16:creationId xmlns:a16="http://schemas.microsoft.com/office/drawing/2014/main" id="{36F76344-44B6-4BF5-8675-F4681773E2EC}"/>
+              </a:ext>
+            </a:extLst>
+          </p:cNvPr>
+          <p:cNvCxnSpPr>
+            <a:cxnSpLocks/>
+          </p:cNvCxnSpPr>
+          <p:nvPr/>
+        </p:nvCxnSpPr>
+        <p:spPr>
+          <a:xfrm flipH="1">
+            <a:off x="1926482" y="4413280"/>
+            <a:ext cx="1543657" cy="0"/>
+          </a:xfrm>
+          <a:prstGeom prst="line">
+            <a:avLst/>
+          </a:prstGeom>
+          <a:ln w="31750" cmpd="sng">
+            <a:solidFill>
+              <a:schemeClr val="tx1"/>
+            </a:solidFill>
+            <a:prstDash val="solid"/>
           </a:ln>
         </p:spPr>
         <p:style>

</xml_diff>

<commit_message>
Implemented mesh generation for Sprocket
Also minor improvements such as "hide preview button", enforcing x>0 when creating curves and editing via text.
</commit_message>
<xml_diff>
--- a/icons.pptx
+++ b/icons.pptx
@@ -261,7 +261,7 @@
           <a:p>
             <a:fld id="{AD340E95-1000-4336-8AFA-0D173D87FB75}" type="datetimeFigureOut">
               <a:rPr lang="en-IL" smtClean="0"/>
-              <a:t>02/01/2022</a:t>
+              <a:t>05/01/2022</a:t>
             </a:fld>
             <a:endParaRPr lang="en-IL"/>
           </a:p>
@@ -461,7 +461,7 @@
           <a:p>
             <a:fld id="{AD340E95-1000-4336-8AFA-0D173D87FB75}" type="datetimeFigureOut">
               <a:rPr lang="en-IL" smtClean="0"/>
-              <a:t>02/01/2022</a:t>
+              <a:t>05/01/2022</a:t>
             </a:fld>
             <a:endParaRPr lang="en-IL"/>
           </a:p>
@@ -671,7 +671,7 @@
           <a:p>
             <a:fld id="{AD340E95-1000-4336-8AFA-0D173D87FB75}" type="datetimeFigureOut">
               <a:rPr lang="en-IL" smtClean="0"/>
-              <a:t>02/01/2022</a:t>
+              <a:t>05/01/2022</a:t>
             </a:fld>
             <a:endParaRPr lang="en-IL"/>
           </a:p>
@@ -871,7 +871,7 @@
           <a:p>
             <a:fld id="{AD340E95-1000-4336-8AFA-0D173D87FB75}" type="datetimeFigureOut">
               <a:rPr lang="en-IL" smtClean="0"/>
-              <a:t>02/01/2022</a:t>
+              <a:t>05/01/2022</a:t>
             </a:fld>
             <a:endParaRPr lang="en-IL"/>
           </a:p>
@@ -1147,7 +1147,7 @@
           <a:p>
             <a:fld id="{AD340E95-1000-4336-8AFA-0D173D87FB75}" type="datetimeFigureOut">
               <a:rPr lang="en-IL" smtClean="0"/>
-              <a:t>02/01/2022</a:t>
+              <a:t>05/01/2022</a:t>
             </a:fld>
             <a:endParaRPr lang="en-IL"/>
           </a:p>
@@ -1415,7 +1415,7 @@
           <a:p>
             <a:fld id="{AD340E95-1000-4336-8AFA-0D173D87FB75}" type="datetimeFigureOut">
               <a:rPr lang="en-IL" smtClean="0"/>
-              <a:t>02/01/2022</a:t>
+              <a:t>05/01/2022</a:t>
             </a:fld>
             <a:endParaRPr lang="en-IL"/>
           </a:p>
@@ -1830,7 +1830,7 @@
           <a:p>
             <a:fld id="{AD340E95-1000-4336-8AFA-0D173D87FB75}" type="datetimeFigureOut">
               <a:rPr lang="en-IL" smtClean="0"/>
-              <a:t>02/01/2022</a:t>
+              <a:t>05/01/2022</a:t>
             </a:fld>
             <a:endParaRPr lang="en-IL"/>
           </a:p>
@@ -1972,7 +1972,7 @@
           <a:p>
             <a:fld id="{AD340E95-1000-4336-8AFA-0D173D87FB75}" type="datetimeFigureOut">
               <a:rPr lang="en-IL" smtClean="0"/>
-              <a:t>02/01/2022</a:t>
+              <a:t>05/01/2022</a:t>
             </a:fld>
             <a:endParaRPr lang="en-IL"/>
           </a:p>
@@ -2085,7 +2085,7 @@
           <a:p>
             <a:fld id="{AD340E95-1000-4336-8AFA-0D173D87FB75}" type="datetimeFigureOut">
               <a:rPr lang="en-IL" smtClean="0"/>
-              <a:t>02/01/2022</a:t>
+              <a:t>05/01/2022</a:t>
             </a:fld>
             <a:endParaRPr lang="en-IL"/>
           </a:p>
@@ -2398,7 +2398,7 @@
           <a:p>
             <a:fld id="{AD340E95-1000-4336-8AFA-0D173D87FB75}" type="datetimeFigureOut">
               <a:rPr lang="en-IL" smtClean="0"/>
-              <a:t>02/01/2022</a:t>
+              <a:t>05/01/2022</a:t>
             </a:fld>
             <a:endParaRPr lang="en-IL"/>
           </a:p>
@@ -2687,7 +2687,7 @@
           <a:p>
             <a:fld id="{AD340E95-1000-4336-8AFA-0D173D87FB75}" type="datetimeFigureOut">
               <a:rPr lang="en-IL" smtClean="0"/>
-              <a:t>02/01/2022</a:t>
+              <a:t>05/01/2022</a:t>
             </a:fld>
             <a:endParaRPr lang="en-IL"/>
           </a:p>
@@ -2930,7 +2930,7 @@
           <a:p>
             <a:fld id="{AD340E95-1000-4336-8AFA-0D173D87FB75}" type="datetimeFigureOut">
               <a:rPr lang="en-IL" smtClean="0"/>
-              <a:t>02/01/2022</a:t>
+              <a:t>05/01/2022</a:t>
             </a:fld>
             <a:endParaRPr lang="en-IL"/>
           </a:p>
@@ -4915,6 +4915,103 @@
           </a:fontRef>
         </p:style>
       </p:cxnSp>
+      <p:sp>
+        <p:nvSpPr>
+          <p:cNvPr id="3" name="&quot;Not Allowed&quot; Symbol 2">
+            <a:extLst>
+              <a:ext uri="{FF2B5EF4-FFF2-40B4-BE49-F238E27FC236}">
+                <a16:creationId xmlns:a16="http://schemas.microsoft.com/office/drawing/2014/main" id="{115B2B5F-E552-4371-8B1F-B714637F2412}"/>
+              </a:ext>
+            </a:extLst>
+          </p:cNvPr>
+          <p:cNvSpPr/>
+          <p:nvPr/>
+        </p:nvSpPr>
+        <p:spPr>
+          <a:xfrm>
+            <a:off x="5262113" y="4002657"/>
+            <a:ext cx="1064447" cy="1064447"/>
+          </a:xfrm>
+          <a:prstGeom prst="noSmoking">
+            <a:avLst/>
+          </a:prstGeom>
+          <a:solidFill>
+            <a:schemeClr val="bg1"/>
+          </a:solidFill>
+          <a:ln w="76200">
+            <a:solidFill>
+              <a:schemeClr val="tx1"/>
+            </a:solidFill>
+          </a:ln>
+        </p:spPr>
+        <p:style>
+          <a:lnRef idx="2">
+            <a:schemeClr val="accent1">
+              <a:shade val="50000"/>
+            </a:schemeClr>
+          </a:lnRef>
+          <a:fillRef idx="1">
+            <a:schemeClr val="accent1"/>
+          </a:fillRef>
+          <a:effectRef idx="0">
+            <a:schemeClr val="accent1"/>
+          </a:effectRef>
+          <a:fontRef idx="minor">
+            <a:schemeClr val="lt1"/>
+          </a:fontRef>
+        </p:style>
+        <p:txBody>
+          <a:bodyPr rtlCol="0" anchor="ctr"/>
+          <a:lstStyle/>
+          <a:p>
+            <a:pPr algn="ctr"/>
+            <a:endParaRPr lang="en-IL">
+              <a:solidFill>
+                <a:schemeClr val="tx1"/>
+              </a:solidFill>
+            </a:endParaRPr>
+          </a:p>
+        </p:txBody>
+      </p:sp>
+      <p:pic>
+        <p:nvPicPr>
+          <p:cNvPr id="35" name="Graphic 34" descr="Checkmark with solid fill">
+            <a:extLst>
+              <a:ext uri="{FF2B5EF4-FFF2-40B4-BE49-F238E27FC236}">
+                <a16:creationId xmlns:a16="http://schemas.microsoft.com/office/drawing/2014/main" id="{02BE2EF4-57FE-442A-AA31-D3042DBCF387}"/>
+              </a:ext>
+            </a:extLst>
+          </p:cNvPr>
+          <p:cNvPicPr>
+            <a:picLocks noChangeAspect="1"/>
+          </p:cNvPicPr>
+          <p:nvPr/>
+        </p:nvPicPr>
+        <p:blipFill>
+          <a:blip r:embed="rId6">
+            <a:extLst>
+              <a:ext uri="{28A0092B-C50C-407E-A947-70E740481C1C}">
+                <a14:useLocalDpi xmlns:a14="http://schemas.microsoft.com/office/drawing/2010/main" val="0"/>
+              </a:ext>
+              <a:ext uri="{96DAC541-7B7A-43D3-8B79-37D633B846F1}">
+                <asvg:svgBlip xmlns:asvg="http://schemas.microsoft.com/office/drawing/2016/SVG/main" r:embed="rId7"/>
+              </a:ext>
+            </a:extLst>
+          </a:blip>
+          <a:stretch>
+            <a:fillRect/>
+          </a:stretch>
+        </p:blipFill>
+        <p:spPr>
+          <a:xfrm>
+            <a:off x="6888227" y="4081913"/>
+            <a:ext cx="914400" cy="914400"/>
+          </a:xfrm>
+          <a:prstGeom prst="rect">
+            <a:avLst/>
+          </a:prstGeom>
+        </p:spPr>
+      </p:pic>
     </p:spTree>
     <p:extLst>
       <p:ext uri="{BB962C8B-B14F-4D97-AF65-F5344CB8AC3E}">

</xml_diff>